<commit_message>
Ch9 completed & Lab8 init.
</commit_message>
<xml_diff>
--- a/HIT_Labs/Lab7/Lab7-2021.pptx
+++ b/HIT_Labs/Lab7/Lab7-2021.pptx
@@ -5,10 +5,10 @@
     <p:sldMasterId id="2147483762" r:id="rId1"/>
   </p:sldMasterIdLst>
   <p:notesMasterIdLst>
-    <p:notesMasterId r:id="rId28"/>
+    <p:notesMasterId r:id="rId29"/>
   </p:notesMasterIdLst>
   <p:handoutMasterIdLst>
-    <p:handoutMasterId r:id="rId29"/>
+    <p:handoutMasterId r:id="rId30"/>
   </p:handoutMasterIdLst>
   <p:sldIdLst>
     <p:sldId id="331" r:id="rId2"/>
@@ -31,12 +31,13 @@
     <p:sldId id="422" r:id="rId19"/>
     <p:sldId id="424" r:id="rId20"/>
     <p:sldId id="425" r:id="rId21"/>
-    <p:sldId id="436" r:id="rId22"/>
-    <p:sldId id="435" r:id="rId23"/>
-    <p:sldId id="426" r:id="rId24"/>
-    <p:sldId id="427" r:id="rId25"/>
-    <p:sldId id="333" r:id="rId26"/>
-    <p:sldId id="419" r:id="rId27"/>
+    <p:sldId id="1232" r:id="rId22"/>
+    <p:sldId id="436" r:id="rId23"/>
+    <p:sldId id="435" r:id="rId24"/>
+    <p:sldId id="426" r:id="rId25"/>
+    <p:sldId id="427" r:id="rId26"/>
+    <p:sldId id="333" r:id="rId27"/>
+    <p:sldId id="419" r:id="rId28"/>
   </p:sldIdLst>
   <p:sldSz cx="9144000" cy="6858000" type="screen4x3"/>
   <p:notesSz cx="6858000" cy="9144000"/>
@@ -237,7 +238,7 @@
             <a:fld id="{C79C02A0-2CB8-F64C-87A7-A5563D28AA9B}" type="datetimeFigureOut">
               <a:rPr lang="en-US" smtClean="0"/>
               <a:pPr/>
-              <a:t>5/30/2021</a:t>
+              <a:t>6/8/2021</a:t>
             </a:fld>
             <a:endParaRPr lang="en-US"/>
           </a:p>
@@ -4619,6 +4620,64 @@
       </p:grpSpPr>
       <p:sp>
         <p:nvSpPr>
+          <p:cNvPr id="547842" name="Rectangle 2"/>
+          <p:cNvSpPr>
+            <a:spLocks noGrp="1" noRot="1" noChangeAspect="1" noChangeArrowheads="1" noTextEdit="1"/>
+          </p:cNvSpPr>
+          <p:nvPr>
+            <p:ph type="sldImg"/>
+          </p:nvPr>
+        </p:nvSpPr>
+        <p:spPr>
+          <a:ln/>
+        </p:spPr>
+      </p:sp>
+      <p:sp>
+        <p:nvSpPr>
+          <p:cNvPr id="547843" name="Rectangle 3"/>
+          <p:cNvSpPr>
+            <a:spLocks noGrp="1" noChangeArrowheads="1"/>
+          </p:cNvSpPr>
+          <p:nvPr>
+            <p:ph type="body" idx="1"/>
+          </p:nvPr>
+        </p:nvSpPr>
+        <p:spPr/>
+        <p:txBody>
+          <a:bodyPr/>
+          <a:lstStyle/>
+          <a:p>
+            <a:endParaRPr lang="en-US" dirty="0"/>
+          </a:p>
+        </p:txBody>
+      </p:sp>
+    </p:spTree>
+  </p:cSld>
+  <p:clrMapOvr>
+    <a:masterClrMapping/>
+  </p:clrMapOvr>
+</p:notes>
+</file>
+
+<file path=ppt/notesSlides/notesSlide6.xml><?xml version="1.0" encoding="utf-8"?>
+<p:notes xmlns:a="http://schemas.openxmlformats.org/drawingml/2006/main" xmlns:r="http://schemas.openxmlformats.org/officeDocument/2006/relationships" xmlns:p="http://schemas.openxmlformats.org/presentationml/2006/main">
+  <p:cSld>
+    <p:spTree>
+      <p:nvGrpSpPr>
+        <p:cNvPr id="1" name=""/>
+        <p:cNvGrpSpPr/>
+        <p:nvPr/>
+      </p:nvGrpSpPr>
+      <p:grpSpPr>
+        <a:xfrm>
+          <a:off x="0" y="0"/>
+          <a:ext cx="0" cy="0"/>
+          <a:chOff x="0" y="0"/>
+          <a:chExt cx="0" cy="0"/>
+        </a:xfrm>
+      </p:grpSpPr>
+      <p:sp>
+        <p:nvSpPr>
           <p:cNvPr id="2" name="幻灯片图像占位符 1"/>
           <p:cNvSpPr>
             <a:spLocks noGrp="1" noRot="1" noChangeAspect="1"/>
@@ -4661,7 +4720,7 @@
 </p:notes>
 </file>
 
-<file path=ppt/notesSlides/notesSlide6.xml><?xml version="1.0" encoding="utf-8"?>
+<file path=ppt/notesSlides/notesSlide7.xml><?xml version="1.0" encoding="utf-8"?>
 <p:notes xmlns:a="http://schemas.openxmlformats.org/drawingml/2006/main" xmlns:r="http://schemas.openxmlformats.org/officeDocument/2006/relationships" xmlns:p="http://schemas.openxmlformats.org/presentationml/2006/main">
   <p:cSld>
     <p:spTree>
@@ -7272,7 +7331,7 @@
             <a:pPr algn="ctr"/>
             <a:fld id="{61531F47-DDC1-4518-9A2D-FF5793C0EA4A}" type="datetime2">
               <a:rPr lang="zh-CN" altLang="en-US" sz="2800" smtClean="0"/>
-              <a:t>2021年5月30日</a:t>
+              <a:t>2021年6月8日</a:t>
             </a:fld>
             <a:endParaRPr lang="zh-CN" altLang="en-US" sz="2800" dirty="0"/>
           </a:p>
@@ -7375,8 +7434,17 @@
             </a:r>
             <a:r>
               <a:rPr lang="zh-CN" altLang="en-US" dirty="0"/>
-              <a:t>显示当前暂停的进程</a:t>
-            </a:r>
+              <a:t>显示作业的状态，如运行的、停止的</a:t>
+            </a:r>
+            <a:r>
+              <a:rPr lang="zh-CN" altLang="en-US" dirty="0">
+                <a:solidFill>
+                  <a:srgbClr val="0000FF"/>
+                </a:solidFill>
+              </a:rPr>
+              <a:t>作业</a:t>
+            </a:r>
+            <a:endParaRPr lang="zh-CN" altLang="en-US" dirty="0"/>
           </a:p>
           <a:p>
             <a:pPr lvl="1">
@@ -7394,7 +7462,15 @@
             </a:r>
             <a:r>
               <a:rPr lang="zh-CN" altLang="en-US" dirty="0"/>
-              <a:t>使第</a:t>
+              <a:t>使停止的后台</a:t>
+            </a:r>
+            <a:r>
+              <a:rPr lang="zh-CN" altLang="en-US" dirty="0">
+                <a:solidFill>
+                  <a:srgbClr val="0000FF"/>
+                </a:solidFill>
+              </a:rPr>
+              <a:t>作业</a:t>
             </a:r>
             <a:r>
               <a:rPr lang="en-US" altLang="zh-CN" dirty="0"/>
@@ -7402,7 +7478,7 @@
             </a:r>
             <a:r>
               <a:rPr lang="zh-CN" altLang="en-US" dirty="0"/>
-              <a:t>个任务在后台运行</a:t>
+              <a:t>在后台继续运行</a:t>
             </a:r>
             <a:r>
               <a:rPr lang="en-US" altLang="zh-CN" dirty="0"/>
@@ -7433,7 +7509,23 @@
             </a:r>
             <a:r>
               <a:rPr lang="zh-CN" altLang="en-US" dirty="0"/>
-              <a:t>使第</a:t>
+              <a:t>使（</a:t>
+            </a:r>
+            <a:r>
+              <a:rPr lang="zh-CN" altLang="en-US"/>
+              <a:t>停止或运行中的</a:t>
+            </a:r>
+            <a:r>
+              <a:rPr lang="zh-CN" altLang="en-US" dirty="0"/>
+              <a:t>）</a:t>
+            </a:r>
+            <a:r>
+              <a:rPr lang="zh-CN" altLang="en-US" dirty="0">
+                <a:solidFill>
+                  <a:srgbClr val="0000FF"/>
+                </a:solidFill>
+              </a:rPr>
+              <a:t>作业</a:t>
             </a:r>
             <a:r>
               <a:rPr lang="en-US" altLang="zh-CN" dirty="0"/>
@@ -7441,7 +7533,7 @@
             </a:r>
             <a:r>
               <a:rPr lang="zh-CN" altLang="en-US" dirty="0"/>
-              <a:t>个任务在前台运行</a:t>
+              <a:t>在前台运行</a:t>
             </a:r>
             <a:endParaRPr lang="en-US" altLang="zh-CN" dirty="0"/>
           </a:p>
@@ -7477,7 +7569,19 @@
             </a:r>
             <a:r>
               <a:rPr lang="zh-CN" altLang="en-US" dirty="0"/>
-              <a:t> 表示对最后一个进程操作</a:t>
+              <a:t> 表示对最后一个</a:t>
+            </a:r>
+            <a:r>
+              <a:rPr lang="zh-CN" altLang="en-US" dirty="0">
+                <a:solidFill>
+                  <a:srgbClr val="0000FF"/>
+                </a:solidFill>
+              </a:rPr>
+              <a:t>作业</a:t>
+            </a:r>
+            <a:r>
+              <a:rPr lang="zh-CN" altLang="en-US" dirty="0"/>
+              <a:t>操作</a:t>
             </a:r>
             <a:endParaRPr lang="en-US" altLang="zh-CN" dirty="0"/>
           </a:p>
@@ -8869,7 +8973,7 @@
             </a:pPr>
             <a:r>
               <a:rPr lang="zh-CN" altLang="en-US" sz="2400" dirty="0"/>
-              <a:t>运         行：</a:t>
+              <a:t>运        行：</a:t>
             </a:r>
             <a:r>
               <a:rPr lang="en-US" altLang="zh-CN" b="0" dirty="0" err="1"/>
@@ -9115,7 +9219,7 @@
             </a:r>
             <a:r>
               <a:rPr lang="zh-CN" altLang="en-US" b="0" dirty="0"/>
-              <a:t>）。是指这个初始子进程</a:t>
+              <a:t>）。</a:t>
             </a:r>
           </a:p>
         </p:txBody>
@@ -9226,7 +9330,27 @@
             </a:r>
             <a:r>
               <a:rPr lang="zh-CN" altLang="en-US" b="0" dirty="0"/>
-              <a:t>发送到当前的前台作业，及该作业的子孙作业（例如，它创建的任何子进程）。如果没有前台工作，那么信号应该没有效果。</a:t>
+              <a:t>发送到当前的</a:t>
+            </a:r>
+            <a:r>
+              <a:rPr lang="zh-CN" altLang="en-US" b="0" dirty="0">
+                <a:solidFill>
+                  <a:srgbClr val="0000FF"/>
+                </a:solidFill>
+              </a:rPr>
+              <a:t>前台作业</a:t>
+            </a:r>
+            <a:r>
+              <a:rPr lang="zh-CN" altLang="en-US" b="0" dirty="0"/>
+              <a:t>，及该作业的子孙（例如，它</a:t>
+            </a:r>
+            <a:r>
+              <a:rPr lang="en-US" altLang="zh-CN" b="0" dirty="0"/>
+              <a:t>fork()</a:t>
+            </a:r>
+            <a:r>
+              <a:rPr lang="zh-CN" altLang="en-US" b="0" dirty="0"/>
+              <a:t>的任何子进程）。如果没有前台作业，信号应该没有效果。</a:t>
             </a:r>
             <a:endParaRPr lang="en-US" altLang="zh-CN" b="0" dirty="0"/>
           </a:p>
@@ -10149,11 +10273,6 @@
               <a:rPr lang="en-US" altLang="zh-CN" dirty="0"/>
               <a:t>SIGTSTP, ...</a:t>
             </a:r>
-            <a:r>
-              <a:rPr lang="zh-CN" altLang="en-US" dirty="0"/>
-              <a:t>。</a:t>
-            </a:r>
-            <a:endParaRPr lang="en-US" altLang="zh-CN" dirty="0"/>
           </a:p>
           <a:p>
             <a:endParaRPr lang="zh-CN" altLang="en-US" dirty="0"/>
@@ -10262,7 +10381,7 @@
             </a:r>
             <a:r>
               <a:rPr lang="zh-CN" altLang="en-US" sz="2800" b="0" dirty="0"/>
-              <a:t>和追踪文件</a:t>
+              <a:t>和轨迹文件</a:t>
             </a:r>
             <a:r>
               <a:rPr lang="en-US" altLang="zh-CN" sz="2800" b="0" dirty="0"/>
@@ -10667,7 +10786,15 @@
             </a:r>
             <a:r>
               <a:rPr lang="zh-CN" altLang="en-US" b="0" dirty="0"/>
-              <a:t>开始验证，没有问题后，在依次验证</a:t>
+              <a:t>开始验证，没有问题后，</a:t>
+            </a:r>
+            <a:r>
+              <a:rPr lang="zh-CN" altLang="en-US" dirty="0"/>
+              <a:t>再</a:t>
+            </a:r>
+            <a:r>
+              <a:rPr lang="zh-CN" altLang="en-US" b="0" dirty="0"/>
+              <a:t>依次验证</a:t>
             </a:r>
             <a:r>
               <a:rPr lang="en-US" altLang="zh-CN" b="0" dirty="0"/>
@@ -11169,6 +11296,495 @@
       </p:grpSpPr>
       <p:sp>
         <p:nvSpPr>
+          <p:cNvPr id="501763" name="Rectangle 3"/>
+          <p:cNvSpPr>
+            <a:spLocks noGrp="1" noChangeArrowheads="1"/>
+          </p:cNvSpPr>
+          <p:nvPr>
+            <p:ph idx="1"/>
+          </p:nvPr>
+        </p:nvSpPr>
+        <p:spPr>
+          <a:xfrm>
+            <a:off x="396875" y="1362074"/>
+            <a:ext cx="8823325" cy="5267325"/>
+          </a:xfrm>
+        </p:spPr>
+        <p:txBody>
+          <a:bodyPr/>
+          <a:lstStyle/>
+          <a:p>
+            <a:pPr marL="0" indent="0">
+              <a:spcBef>
+                <a:spcPts val="0"/>
+              </a:spcBef>
+              <a:buNone/>
+            </a:pPr>
+            <a:r>
+              <a:rPr lang="en-US" dirty="0" err="1"/>
+              <a:t>pid_t</a:t>
+            </a:r>
+            <a:r>
+              <a:rPr lang="en-US" dirty="0"/>
+              <a:t> </a:t>
+            </a:r>
+            <a:r>
+              <a:rPr lang="en-US" dirty="0" err="1"/>
+              <a:t>waitpid</a:t>
+            </a:r>
+            <a:r>
+              <a:rPr lang="en-US" dirty="0"/>
+              <a:t>(</a:t>
+            </a:r>
+            <a:r>
+              <a:rPr lang="en-US" dirty="0" err="1"/>
+              <a:t>pid_t</a:t>
+            </a:r>
+            <a:r>
+              <a:rPr lang="en-US" dirty="0"/>
+              <a:t> </a:t>
+            </a:r>
+            <a:r>
+              <a:rPr lang="en-US" dirty="0" err="1"/>
+              <a:t>pid</a:t>
+            </a:r>
+            <a:r>
+              <a:rPr lang="en-US" dirty="0"/>
+              <a:t>, int &amp;status, int options)</a:t>
+            </a:r>
+          </a:p>
+          <a:p>
+            <a:pPr marL="57150" indent="0">
+              <a:spcBef>
+                <a:spcPts val="0"/>
+              </a:spcBef>
+              <a:buNone/>
+            </a:pPr>
+            <a:r>
+              <a:rPr lang="zh-CN" altLang="en-US" dirty="0"/>
+              <a:t>等待指定进程终止、停止或收到</a:t>
+            </a:r>
+            <a:r>
+              <a:rPr lang="en-US" altLang="zh-CN" dirty="0"/>
+              <a:t>SIGCONT</a:t>
+            </a:r>
+            <a:r>
+              <a:rPr lang="zh-CN" altLang="en-US" dirty="0"/>
+              <a:t>信号</a:t>
+            </a:r>
+            <a:endParaRPr lang="en-US" altLang="zh-CN" dirty="0"/>
+          </a:p>
+          <a:p>
+            <a:pPr>
+              <a:spcBef>
+                <a:spcPts val="0"/>
+              </a:spcBef>
+            </a:pPr>
+            <a:r>
+              <a:rPr lang="en-US" altLang="zh-CN" sz="2400" b="1" dirty="0" err="1"/>
+              <a:t>pid</a:t>
+            </a:r>
+            <a:endParaRPr lang="en-US" altLang="zh-CN" sz="2400" b="1" dirty="0"/>
+          </a:p>
+          <a:p>
+            <a:pPr lvl="1">
+              <a:spcBef>
+                <a:spcPts val="0"/>
+              </a:spcBef>
+              <a:buClr>
+                <a:srgbClr val="C00000"/>
+              </a:buClr>
+              <a:buFont typeface="Wingdings" panose="05000000000000000000" pitchFamily="2" charset="2"/>
+              <a:buChar char="ü"/>
+            </a:pPr>
+            <a:r>
+              <a:rPr lang="en-US" altLang="zh-CN" sz="2000" dirty="0" err="1"/>
+              <a:t>pid</a:t>
+            </a:r>
+            <a:r>
+              <a:rPr lang="en-US" altLang="zh-CN" sz="2000" dirty="0"/>
+              <a:t>&gt;0: </a:t>
+            </a:r>
+            <a:r>
+              <a:rPr lang="zh-CN" altLang="en-US" sz="2000" dirty="0"/>
+              <a:t>等待集合是该</a:t>
+            </a:r>
+            <a:r>
+              <a:rPr lang="en-US" altLang="zh-CN" sz="2000" dirty="0" err="1"/>
+              <a:t>pid</a:t>
+            </a:r>
+            <a:r>
+              <a:rPr lang="zh-CN" altLang="en-US" sz="2000" dirty="0"/>
+              <a:t>指定的进程</a:t>
+            </a:r>
+            <a:endParaRPr lang="en-US" altLang="zh-CN" sz="2000" dirty="0"/>
+          </a:p>
+          <a:p>
+            <a:pPr lvl="1">
+              <a:spcBef>
+                <a:spcPts val="0"/>
+              </a:spcBef>
+              <a:buClr>
+                <a:srgbClr val="C00000"/>
+              </a:buClr>
+              <a:buFont typeface="Wingdings" panose="05000000000000000000" pitchFamily="2" charset="2"/>
+              <a:buChar char="ü"/>
+            </a:pPr>
+            <a:r>
+              <a:rPr lang="en-US" altLang="zh-CN" b="1" dirty="0" err="1">
+                <a:solidFill>
+                  <a:srgbClr val="006600"/>
+                </a:solidFill>
+              </a:rPr>
+              <a:t>pid</a:t>
+            </a:r>
+            <a:r>
+              <a:rPr lang="en-US" altLang="zh-CN" b="1" dirty="0">
+                <a:solidFill>
+                  <a:srgbClr val="006600"/>
+                </a:solidFill>
+              </a:rPr>
+              <a:t>=-1:</a:t>
+            </a:r>
+            <a:r>
+              <a:rPr lang="zh-CN" altLang="en-US" b="1" dirty="0">
+                <a:solidFill>
+                  <a:srgbClr val="006600"/>
+                </a:solidFill>
+              </a:rPr>
+              <a:t>所有子进程</a:t>
+            </a:r>
+            <a:endParaRPr lang="en-US" altLang="zh-CN" b="1" dirty="0">
+              <a:solidFill>
+                <a:srgbClr val="006600"/>
+              </a:solidFill>
+            </a:endParaRPr>
+          </a:p>
+          <a:p>
+            <a:pPr lvl="1">
+              <a:spcBef>
+                <a:spcPts val="0"/>
+              </a:spcBef>
+              <a:buClr>
+                <a:srgbClr val="C00000"/>
+              </a:buClr>
+              <a:buFont typeface="Wingdings" panose="05000000000000000000" pitchFamily="2" charset="2"/>
+              <a:buChar char="ü"/>
+            </a:pPr>
+            <a:r>
+              <a:rPr lang="en-US" altLang="zh-CN" sz="2000" dirty="0" err="1"/>
+              <a:t>pid</a:t>
+            </a:r>
+            <a:r>
+              <a:rPr lang="en-US" altLang="zh-CN" sz="2000" dirty="0"/>
+              <a:t>&lt;-1</a:t>
+            </a:r>
+            <a:r>
+              <a:rPr lang="zh-CN" altLang="en-US" sz="2000" dirty="0"/>
+              <a:t>时，等待</a:t>
+            </a:r>
+            <a:r>
+              <a:rPr lang="en-US" altLang="zh-CN" sz="2000" dirty="0"/>
+              <a:t>ID</a:t>
+            </a:r>
+            <a:r>
+              <a:rPr lang="zh-CN" altLang="en-US" sz="2000" dirty="0"/>
+              <a:t>为</a:t>
+            </a:r>
+            <a:r>
+              <a:rPr lang="en-US" altLang="zh-CN" sz="2000" dirty="0"/>
+              <a:t>|</a:t>
+            </a:r>
+            <a:r>
+              <a:rPr lang="en-US" altLang="zh-CN" sz="2000" dirty="0" err="1"/>
+              <a:t>pid</a:t>
+            </a:r>
+            <a:r>
+              <a:rPr lang="en-US" altLang="zh-CN" sz="2000" dirty="0"/>
+              <a:t>|</a:t>
+            </a:r>
+            <a:r>
+              <a:rPr lang="zh-CN" altLang="en-US" sz="2000" dirty="0"/>
+              <a:t>的进程组中的任何子进程</a:t>
+            </a:r>
+          </a:p>
+          <a:p>
+            <a:pPr lvl="1">
+              <a:spcBef>
+                <a:spcPts val="0"/>
+              </a:spcBef>
+              <a:buClr>
+                <a:srgbClr val="C00000"/>
+              </a:buClr>
+              <a:buFont typeface="Wingdings" panose="05000000000000000000" pitchFamily="2" charset="2"/>
+              <a:buChar char="ü"/>
+            </a:pPr>
+            <a:r>
+              <a:rPr lang="en-US" altLang="zh-CN" sz="2000" dirty="0" err="1"/>
+              <a:t>pid</a:t>
+            </a:r>
+            <a:r>
+              <a:rPr lang="en-US" altLang="zh-CN" sz="2000" dirty="0"/>
+              <a:t>=0</a:t>
+            </a:r>
+            <a:r>
+              <a:rPr lang="zh-CN" altLang="en-US" sz="2000" dirty="0"/>
+              <a:t>时，等待同一个进程组中的任何子进程 </a:t>
+            </a:r>
+          </a:p>
+          <a:p>
+            <a:pPr>
+              <a:spcBef>
+                <a:spcPts val="0"/>
+              </a:spcBef>
+            </a:pPr>
+            <a:r>
+              <a:rPr lang="en-US" altLang="zh-CN" sz="2400" b="1" dirty="0"/>
+              <a:t>wait</a:t>
+            </a:r>
+            <a:r>
+              <a:rPr lang="en-US" altLang="zh-CN" sz="2400" dirty="0"/>
+              <a:t>(&amp;status) </a:t>
+            </a:r>
+            <a:r>
+              <a:rPr lang="zh-CN" altLang="en-US" sz="2400" dirty="0"/>
+              <a:t>等价于 </a:t>
+            </a:r>
+            <a:r>
+              <a:rPr lang="en-US" altLang="zh-CN" sz="2400" dirty="0" err="1"/>
+              <a:t>waitpid</a:t>
+            </a:r>
+            <a:r>
+              <a:rPr lang="en-US" altLang="zh-CN" sz="2400" dirty="0"/>
+              <a:t>(-1,&amp;status, 0);</a:t>
+            </a:r>
+          </a:p>
+          <a:p>
+            <a:pPr>
+              <a:spcBef>
+                <a:spcPts val="0"/>
+              </a:spcBef>
+            </a:pPr>
+            <a:r>
+              <a:rPr lang="en-US" sz="2400" b="1" dirty="0"/>
+              <a:t>option</a:t>
+            </a:r>
+            <a:r>
+              <a:rPr lang="en-US" sz="2400" dirty="0"/>
+              <a:t>:</a:t>
+            </a:r>
+            <a:r>
+              <a:rPr lang="en-US" altLang="zh-CN" sz="2400" dirty="0"/>
+              <a:t>0</a:t>
+            </a:r>
+            <a:r>
+              <a:rPr lang="zh-CN" altLang="en-US" sz="2400" dirty="0"/>
+              <a:t>，默认挂起当前进程直到有子进程终止，或以下选项的组合</a:t>
+            </a:r>
+            <a:r>
+              <a:rPr lang="en-US" altLang="zh-CN" sz="2400" dirty="0"/>
+              <a:t>(</a:t>
+            </a:r>
+            <a:r>
+              <a:rPr lang="zh-CN" altLang="en-US" sz="2400" dirty="0"/>
+              <a:t>或运算</a:t>
+            </a:r>
+            <a:r>
+              <a:rPr lang="en-US" altLang="zh-CN" sz="2400" dirty="0"/>
+              <a:t>|)</a:t>
+            </a:r>
+          </a:p>
+          <a:p>
+            <a:pPr lvl="1">
+              <a:spcBef>
+                <a:spcPts val="0"/>
+              </a:spcBef>
+              <a:buClr>
+                <a:srgbClr val="C00000"/>
+              </a:buClr>
+              <a:buFont typeface="Wingdings" panose="05000000000000000000" pitchFamily="2" charset="2"/>
+              <a:buChar char="ü"/>
+            </a:pPr>
+            <a:r>
+              <a:rPr lang="en-US" b="1" dirty="0">
+                <a:solidFill>
+                  <a:srgbClr val="006600"/>
+                </a:solidFill>
+              </a:rPr>
+              <a:t>WNOHANG: </a:t>
+            </a:r>
+            <a:r>
+              <a:rPr lang="zh-CN" altLang="en-US" b="1" dirty="0">
+                <a:solidFill>
+                  <a:srgbClr val="006600"/>
+                </a:solidFill>
+              </a:rPr>
+              <a:t>不挂起，立即返回，若无子进程终止返回</a:t>
+            </a:r>
+            <a:r>
+              <a:rPr lang="en-US" altLang="zh-CN" b="1" dirty="0">
+                <a:solidFill>
+                  <a:srgbClr val="006600"/>
+                </a:solidFill>
+              </a:rPr>
+              <a:t>0</a:t>
+            </a:r>
+            <a:r>
+              <a:rPr lang="zh-CN" altLang="en-US" b="1" dirty="0">
+                <a:solidFill>
+                  <a:srgbClr val="006600"/>
+                </a:solidFill>
+              </a:rPr>
+              <a:t>值。</a:t>
+            </a:r>
+            <a:endParaRPr lang="en-US" b="1" dirty="0">
+              <a:solidFill>
+                <a:srgbClr val="006600"/>
+              </a:solidFill>
+            </a:endParaRPr>
+          </a:p>
+          <a:p>
+            <a:pPr lvl="1">
+              <a:spcBef>
+                <a:spcPts val="0"/>
+              </a:spcBef>
+              <a:buClr>
+                <a:srgbClr val="C00000"/>
+              </a:buClr>
+              <a:buFont typeface="Wingdings" panose="05000000000000000000" pitchFamily="2" charset="2"/>
+              <a:buChar char="ü"/>
+            </a:pPr>
+            <a:r>
+              <a:rPr lang="en-US" b="1" dirty="0">
+                <a:solidFill>
+                  <a:srgbClr val="006600"/>
+                </a:solidFill>
+              </a:rPr>
+              <a:t>WUNTRACED: </a:t>
+            </a:r>
+            <a:r>
+              <a:rPr lang="zh-CN" altLang="en-US" b="1" dirty="0">
+                <a:solidFill>
+                  <a:srgbClr val="006600"/>
+                </a:solidFill>
+              </a:rPr>
+              <a:t>挂起，等待集合中的一个进程终止或停止</a:t>
+            </a:r>
+            <a:endParaRPr lang="en-US" altLang="zh-CN" b="1" dirty="0">
+              <a:solidFill>
+                <a:srgbClr val="006600"/>
+              </a:solidFill>
+            </a:endParaRPr>
+          </a:p>
+          <a:p>
+            <a:pPr lvl="1">
+              <a:spcBef>
+                <a:spcPts val="0"/>
+              </a:spcBef>
+              <a:buClr>
+                <a:srgbClr val="C00000"/>
+              </a:buClr>
+              <a:buFont typeface="Wingdings" panose="05000000000000000000" pitchFamily="2" charset="2"/>
+              <a:buChar char="ü"/>
+            </a:pPr>
+            <a:r>
+              <a:rPr lang="en-US" sz="2000" dirty="0"/>
+              <a:t>WCONTINUED:</a:t>
+            </a:r>
+            <a:r>
+              <a:rPr lang="zh-CN" altLang="en-US" sz="2000" dirty="0"/>
+              <a:t>挂起，等待集合中的一个进程终止</a:t>
+            </a:r>
+            <a:r>
+              <a:rPr lang="zh-CN" altLang="en-US" sz="2000" b="1" dirty="0">
+                <a:solidFill>
+                  <a:srgbClr val="0000CC"/>
+                </a:solidFill>
+              </a:rPr>
+              <a:t>或收到</a:t>
+            </a:r>
+            <a:r>
+              <a:rPr lang="en-US" altLang="zh-CN" sz="2000" b="1" dirty="0">
+                <a:solidFill>
+                  <a:srgbClr val="0000CC"/>
+                </a:solidFill>
+              </a:rPr>
+              <a:t>SIGCONT</a:t>
+            </a:r>
+            <a:r>
+              <a:rPr lang="zh-CN" altLang="en-US" sz="2000" b="1" dirty="0">
+                <a:solidFill>
+                  <a:srgbClr val="0000CC"/>
+                </a:solidFill>
+              </a:rPr>
+              <a:t>而从停止状态重新开始</a:t>
+            </a:r>
+            <a:endParaRPr lang="en-US" sz="2000" b="1" dirty="0">
+              <a:solidFill>
+                <a:srgbClr val="0000CC"/>
+              </a:solidFill>
+            </a:endParaRPr>
+          </a:p>
+        </p:txBody>
+      </p:sp>
+      <p:sp>
+        <p:nvSpPr>
+          <p:cNvPr id="501762" name="Rectangle 2"/>
+          <p:cNvSpPr>
+            <a:spLocks noGrp="1" noChangeArrowheads="1"/>
+          </p:cNvSpPr>
+          <p:nvPr>
+            <p:ph type="title"/>
+          </p:nvPr>
+        </p:nvSpPr>
+        <p:spPr/>
+        <p:txBody>
+          <a:bodyPr/>
+          <a:lstStyle/>
+          <a:p>
+            <a:r>
+              <a:rPr lang="en-US" altLang="zh-CN" dirty="0" err="1"/>
+              <a:t>waitpid</a:t>
+            </a:r>
+            <a:r>
+              <a:rPr lang="en-US" altLang="zh-CN" dirty="0"/>
+              <a:t>:</a:t>
+            </a:r>
+            <a:r>
+              <a:rPr lang="zh-CN" altLang="en-US" dirty="0"/>
+              <a:t>等待特定进程</a:t>
+            </a:r>
+            <a:endParaRPr lang="en-US" dirty="0"/>
+          </a:p>
+        </p:txBody>
+      </p:sp>
+    </p:spTree>
+  </p:cSld>
+  <p:clrMapOvr>
+    <a:masterClrMapping/>
+  </p:clrMapOvr>
+</p:sld>
+</file>
+
+<file path=ppt/slides/slide22.xml><?xml version="1.0" encoding="utf-8"?>
+<p:sld xmlns:a="http://schemas.openxmlformats.org/drawingml/2006/main" xmlns:r="http://schemas.openxmlformats.org/officeDocument/2006/relationships" xmlns:p="http://schemas.openxmlformats.org/presentationml/2006/main">
+  <p:cSld>
+    <p:spTree>
+      <p:nvGrpSpPr>
+        <p:cNvPr id="1" name=""/>
+        <p:cNvGrpSpPr/>
+        <p:nvPr/>
+      </p:nvGrpSpPr>
+      <p:grpSpPr>
+        <a:xfrm>
+          <a:off x="0" y="0"/>
+          <a:ext cx="0" cy="0"/>
+          <a:chOff x="0" y="0"/>
+          <a:chExt cx="0" cy="0"/>
+        </a:xfrm>
+      </p:grpSpPr>
+      <p:sp>
+        <p:nvSpPr>
           <p:cNvPr id="6" name="内容占位符 5">
             <a:extLst>
               <a:ext uri="{FF2B5EF4-FFF2-40B4-BE49-F238E27FC236}">
@@ -11456,7 +12072,7 @@
 </p:sld>
 </file>
 
-<file path=ppt/slides/slide22.xml><?xml version="1.0" encoding="utf-8"?>
+<file path=ppt/slides/slide23.xml><?xml version="1.0" encoding="utf-8"?>
 <p:sld xmlns:a="http://schemas.openxmlformats.org/drawingml/2006/main" xmlns:r="http://schemas.openxmlformats.org/officeDocument/2006/relationships" xmlns:p="http://schemas.openxmlformats.org/presentationml/2006/main">
   <p:cSld>
     <p:spTree>
@@ -11664,7 +12280,20 @@
                 <a:latin typeface="Times New Roman" panose="02020603050405020304" pitchFamily="18" charset="0"/>
                 <a:cs typeface="Times New Roman" panose="02020603050405020304" pitchFamily="18" charset="0"/>
               </a:rPr>
-              <a:t>(-1, &amp;status, </a:t>
+              <a:t>(-1, &amp;status,          </a:t>
+            </a:r>
+          </a:p>
+          <a:p>
+            <a:pPr marL="0" lvl="1" indent="0">
+              <a:buNone/>
+            </a:pPr>
+            <a:r>
+              <a:rPr lang="en-US" altLang="zh-CN" b="1" dirty="0">
+                <a:solidFill>
+                  <a:srgbClr val="0000FF"/>
+                </a:solidFill>
+              </a:rPr>
+              <a:t>                                                </a:t>
             </a:r>
             <a:r>
               <a:rPr lang="en-US" altLang="zh-CN" b="1" dirty="0">
@@ -11781,7 +12410,7 @@
 </p:sld>
 </file>
 
-<file path=ppt/slides/slide23.xml><?xml version="1.0" encoding="utf-8"?>
+<file path=ppt/slides/slide24.xml><?xml version="1.0" encoding="utf-8"?>
 <p:sld xmlns:a="http://schemas.openxmlformats.org/drawingml/2006/main" xmlns:r="http://schemas.openxmlformats.org/officeDocument/2006/relationships" xmlns:p="http://schemas.openxmlformats.org/presentationml/2006/main">
   <p:cSld>
     <p:spTree>
@@ -12010,12 +12639,12 @@
               <a:t>/bin/ls</a:t>
             </a:r>
             <a:r>
-              <a:rPr lang="zh-CN" altLang="en-US" b="0" dirty="0"/>
-              <a:t>，  </a:t>
+              <a:rPr lang="en-US" altLang="zh-CN" b="0" dirty="0"/>
+              <a:t>, </a:t>
             </a:r>
             <a:r>
               <a:rPr lang="de-DE" altLang="zh-CN" b="0" dirty="0"/>
-              <a:t>/bin/ps,    /bin/echo</a:t>
+              <a:t>/bin/ps, /bin/echo</a:t>
             </a:r>
             <a:endParaRPr lang="zh-CN" altLang="en-US" dirty="0"/>
           </a:p>
@@ -12066,7 +12695,7 @@
 </p:sld>
 </file>
 
-<file path=ppt/slides/slide24.xml><?xml version="1.0" encoding="utf-8"?>
+<file path=ppt/slides/slide25.xml><?xml version="1.0" encoding="utf-8"?>
 <p:sld xmlns:a="http://schemas.openxmlformats.org/drawingml/2006/main" xmlns:r="http://schemas.openxmlformats.org/officeDocument/2006/relationships" xmlns:p="http://schemas.openxmlformats.org/presentationml/2006/main">
   <p:cSld>
     <p:spTree>
@@ -12420,7 +13049,7 @@
 </p:sld>
 </file>
 
-<file path=ppt/slides/slide25.xml><?xml version="1.0" encoding="utf-8"?>
+<file path=ppt/slides/slide26.xml><?xml version="1.0" encoding="utf-8"?>
 <p:sld xmlns:a="http://schemas.openxmlformats.org/drawingml/2006/main" xmlns:r="http://schemas.openxmlformats.org/officeDocument/2006/relationships" xmlns:p="http://schemas.openxmlformats.org/presentationml/2006/main">
   <p:cSld>
     <p:spTree>
@@ -12649,7 +13278,7 @@
 </p:sld>
 </file>
 
-<file path=ppt/slides/slide26.xml><?xml version="1.0" encoding="utf-8"?>
+<file path=ppt/slides/slide27.xml><?xml version="1.0" encoding="utf-8"?>
 <p:sld xmlns:a="http://schemas.openxmlformats.org/drawingml/2006/main" xmlns:r="http://schemas.openxmlformats.org/officeDocument/2006/relationships" xmlns:p="http://schemas.openxmlformats.org/presentationml/2006/main">
   <p:cSld>
     <p:spTree>

</xml_diff>